<commit_message>
Minor addition to one slide
</commit_message>
<xml_diff>
--- a/data_formatting.pptx
+++ b/data_formatting.pptx
@@ -11571,11 +11571,13 @@
           <a:p>
             <a:r>
               <a:rPr lang="en-GB" sz="2800" dirty="0"/>
-              <a:t>This can lead to problems if your records are </a:t>
-            </a:r>
-            <a:r>
-              <a:rPr lang="en-GB" sz="2800"/>
-              <a:t>not perfect</a:t>
+              <a:t>This can lead to problems if your records are not perfect</a:t>
+            </a:r>
+          </a:p>
+          <a:p>
+            <a:r>
+              <a:rPr lang="en-GB" dirty="0"/>
+              <a:t>Lab/Field notebooks can be easily damaged or lost</a:t>
             </a:r>
             <a:endParaRPr lang="en-GB" sz="2800" dirty="0"/>
           </a:p>

</xml_diff>